<commit_message>
Second iteration on first lecture.
</commit_message>
<xml_diff>
--- a/slides/CSFG5.pptx
+++ b/slides/CSFG5.pptx
@@ -22689,16 +22689,7 @@
                 </a:solidFill>
                 <a:latin typeface="Arial" charset="0"/>
               </a:rPr>
-              <a:t>square of standard </a:t>
-            </a:r>
-            <a:r>
-              <a:rPr lang="en-GB" altLang="en-US" sz="2800" dirty="0" smtClean="0">
-                <a:solidFill>
-                  <a:srgbClr val="FFC000"/>
-                </a:solidFill>
-                <a:latin typeface="Arial" charset="0"/>
-              </a:rPr>
-              <a:t>deviation.</a:t>
+              <a:t>square of standard deviation.</a:t>
             </a:r>
             <a:endParaRPr lang="en-GB" altLang="en-US" sz="2800" dirty="0">
               <a:solidFill>
@@ -24939,16 +24930,7 @@
                 </a:solidFill>
                 <a:latin typeface="Arial" charset="0"/>
               </a:rPr>
-              <a:t>Download the </a:t>
-            </a:r>
-            <a:r>
-              <a:rPr lang="en-GB" altLang="en-US" sz="2400" dirty="0" smtClean="0">
-                <a:solidFill>
-                  <a:schemeClr val="bg1"/>
-                </a:solidFill>
-                <a:latin typeface="Arial" charset="0"/>
-              </a:rPr>
-              <a:t>course material from:</a:t>
+              <a:t>Download the course material from:</a:t>
             </a:r>
           </a:p>
           <a:p>
@@ -25651,14 +25633,7 @@
                   <a:latin typeface="Arial" panose="020B0604020202020204" pitchFamily="34" charset="0"/>
                   <a:cs typeface="Arial" panose="020B0604020202020204" pitchFamily="34" charset="0"/>
                 </a:rPr>
-                <a:t>’ </a:t>
-              </a:r>
-              <a:r>
-                <a:rPr lang="en-GB" sz="2200" b="0" dirty="0" smtClean="0">
-                  <a:latin typeface="Arial" panose="020B0604020202020204" pitchFamily="34" charset="0"/>
-                  <a:cs typeface="Arial" panose="020B0604020202020204" pitchFamily="34" charset="0"/>
-                </a:rPr>
-                <a:t>(use %load </a:t>
+                <a:t>’ (use %load </a:t>
               </a:r>
               <a:r>
                 <a:rPr lang="en-GB" sz="2200" b="0" dirty="0" err="1" smtClean="0">
@@ -25679,14 +25654,7 @@
                   <a:latin typeface="Courier" pitchFamily="49" charset="0"/>
                   <a:cs typeface="Arial" panose="020B0604020202020204" pitchFamily="34" charset="0"/>
                 </a:rPr>
-                <a:t>%load </a:t>
-              </a:r>
-              <a:r>
-                <a:rPr lang="en-GB" sz="2200" dirty="0" smtClean="0">
-                  <a:latin typeface="Courier" pitchFamily="49" charset="0"/>
-                  <a:cs typeface="Arial" panose="020B0604020202020204" pitchFamily="34" charset="0"/>
-                </a:rPr>
-                <a:t>data/</a:t>
+                <a:t>%load data/</a:t>
               </a:r>
               <a:r>
                 <a:rPr lang="en-GB" sz="2200" dirty="0" err="1" smtClean="0">
@@ -25725,21 +25693,7 @@
                   <a:latin typeface="Arial" panose="020B0604020202020204" pitchFamily="34" charset="0"/>
                   <a:cs typeface="Arial" panose="020B0604020202020204" pitchFamily="34" charset="0"/>
                 </a:rPr>
-                <a:t>. Write a program to read </a:t>
-              </a:r>
-              <a:r>
-                <a:rPr lang="en-GB" sz="2200" b="0" dirty="0" smtClean="0">
-                  <a:latin typeface="Arial" panose="020B0604020202020204" pitchFamily="34" charset="0"/>
-                  <a:cs typeface="Arial" panose="020B0604020202020204" pitchFamily="34" charset="0"/>
-                </a:rPr>
-                <a:t>in the data and </a:t>
-              </a:r>
-              <a:r>
-                <a:rPr lang="en-GB" sz="2200" b="0" dirty="0" smtClean="0">
-                  <a:latin typeface="Arial" panose="020B0604020202020204" pitchFamily="34" charset="0"/>
-                  <a:cs typeface="Arial" panose="020B0604020202020204" pitchFamily="34" charset="0"/>
-                </a:rPr>
-                <a:t>then calculate the mean, median, range, interquartile range, standard deviation, variance, and mode.</a:t>
+                <a:t>. Write a program to read in the data and then calculate the mean, median, range, interquartile range, standard deviation, variance, and mode.</a:t>
               </a:r>
             </a:p>
             <a:p>
@@ -25757,47 +25711,8 @@
                   <a:latin typeface="Arial" panose="020B0604020202020204" pitchFamily="34" charset="0"/>
                   <a:cs typeface="Arial" panose="020B0604020202020204" pitchFamily="34" charset="0"/>
                 </a:rPr>
-                <a:t>3. </a:t>
+                <a:t>3. Try to write a better mode function; where there is more than one mode (e.g. in [1,2,2,3,3]) it should return all modes as a list.</a:t>
               </a:r>
-              <a:r>
-                <a:rPr lang="en-GB" sz="2200" b="0" dirty="0" smtClean="0">
-                  <a:latin typeface="Arial" panose="020B0604020202020204" pitchFamily="34" charset="0"/>
-                  <a:cs typeface="Arial" panose="020B0604020202020204" pitchFamily="34" charset="0"/>
-                </a:rPr>
-                <a:t>Try </a:t>
-              </a:r>
-              <a:r>
-                <a:rPr lang="en-GB" sz="2200" b="0" dirty="0" smtClean="0">
-                  <a:latin typeface="Arial" panose="020B0604020202020204" pitchFamily="34" charset="0"/>
-                  <a:cs typeface="Arial" panose="020B0604020202020204" pitchFamily="34" charset="0"/>
-                </a:rPr>
-                <a:t>to write a better mode function; where there is more than one mode (e.g. in [1,2,2,3,3]) it should return all modes </a:t>
-              </a:r>
-              <a:r>
-                <a:rPr lang="en-GB" sz="2200" b="0" dirty="0" smtClean="0">
-                  <a:latin typeface="Arial" panose="020B0604020202020204" pitchFamily="34" charset="0"/>
-                  <a:cs typeface="Arial" panose="020B0604020202020204" pitchFamily="34" charset="0"/>
-                </a:rPr>
-                <a:t>as </a:t>
-              </a:r>
-              <a:r>
-                <a:rPr lang="en-GB" sz="2200" b="0" dirty="0" smtClean="0">
-                  <a:latin typeface="Arial" panose="020B0604020202020204" pitchFamily="34" charset="0"/>
-                  <a:cs typeface="Arial" panose="020B0604020202020204" pitchFamily="34" charset="0"/>
-                </a:rPr>
-                <a:t>a </a:t>
-              </a:r>
-              <a:r>
-                <a:rPr lang="en-GB" sz="2200" b="0" dirty="0" smtClean="0">
-                  <a:latin typeface="Arial" panose="020B0604020202020204" pitchFamily="34" charset="0"/>
-                  <a:cs typeface="Arial" panose="020B0604020202020204" pitchFamily="34" charset="0"/>
-                </a:rPr>
-                <a:t>list.</a:t>
-              </a:r>
-              <a:endParaRPr lang="en-GB" sz="2200" b="0" dirty="0" smtClean="0">
-                <a:latin typeface="Arial" panose="020B0604020202020204" pitchFamily="34" charset="0"/>
-                <a:cs typeface="Arial" panose="020B0604020202020204" pitchFamily="34" charset="0"/>
-              </a:endParaRPr>
             </a:p>
           </p:txBody>
         </p:sp>
@@ -26498,25 +26413,7 @@
                 </a:solidFill>
                 <a:latin typeface="Arial" charset="0"/>
               </a:rPr>
-              <a:t> remember to start </a:t>
-            </a:r>
-            <a:r>
-              <a:rPr lang="en-GB" altLang="en-US" sz="2000" dirty="0" smtClean="0">
-                <a:solidFill>
-                  <a:srgbClr val="FFFF99"/>
-                </a:solidFill>
-                <a:latin typeface="Arial" charset="0"/>
-              </a:rPr>
-              <a:t>your programs with</a:t>
-            </a:r>
-            <a:r>
-              <a:rPr lang="en-GB" altLang="en-US" sz="2000" dirty="0" smtClean="0">
-                <a:solidFill>
-                  <a:srgbClr val="FFFF99"/>
-                </a:solidFill>
-                <a:latin typeface="Arial" charset="0"/>
-              </a:rPr>
-              <a:t>:</a:t>
+              <a:t> remember to start your programs with:</a:t>
             </a:r>
           </a:p>
           <a:p>
@@ -26555,16 +26452,7 @@
                 </a:solidFill>
                 <a:latin typeface="Arial" charset="0"/>
               </a:rPr>
-              <a:t> </a:t>
-            </a:r>
-            <a:r>
-              <a:rPr lang="en-GB" altLang="en-US" sz="2000" dirty="0" smtClean="0">
-                <a:solidFill>
-                  <a:srgbClr val="FFFF99"/>
-                </a:solidFill>
-                <a:latin typeface="Arial" charset="0"/>
-              </a:rPr>
-              <a:t>		</a:t>
+              <a:t> 		</a:t>
             </a:r>
             <a:r>
               <a:rPr lang="en-GB" altLang="en-US" sz="2000" dirty="0" smtClean="0">
@@ -26591,16 +26479,7 @@
                 </a:solidFill>
                 <a:latin typeface="Courier" pitchFamily="49" charset="0"/>
               </a:rPr>
-              <a:t> </a:t>
-            </a:r>
-            <a:r>
-              <a:rPr lang="en-GB" altLang="en-US" sz="2000" dirty="0" smtClean="0">
-                <a:solidFill>
-                  <a:srgbClr val="FFFF99"/>
-                </a:solidFill>
-                <a:latin typeface="Courier" pitchFamily="49" charset="0"/>
-              </a:rPr>
-              <a:t>inline</a:t>
+              <a:t> inline</a:t>
             </a:r>
           </a:p>
           <a:p>
@@ -26675,12 +26554,6 @@
               </a:rPr>
               <a:t> functions.</a:t>
             </a:r>
-            <a:endParaRPr lang="en-GB" altLang="en-US" sz="1800" dirty="0" smtClean="0">
-              <a:solidFill>
-                <a:srgbClr val="FFFF00"/>
-              </a:solidFill>
-              <a:latin typeface="Arial" charset="0"/>
-            </a:endParaRPr>
           </a:p>
           <a:p>
             <a:pPr lvl="2">
@@ -26698,16 +26571,7 @@
                 </a:solidFill>
                 <a:latin typeface="Arial" charset="0"/>
               </a:rPr>
-              <a:t>Forces graphs to </a:t>
-            </a:r>
-            <a:r>
-              <a:rPr lang="en-GB" altLang="en-US" sz="1800" dirty="0" smtClean="0">
-                <a:solidFill>
-                  <a:srgbClr val="FFFF00"/>
-                </a:solidFill>
-                <a:latin typeface="Arial" charset="0"/>
-              </a:rPr>
-              <a:t>be </a:t>
+              <a:t>Forces graphs to be </a:t>
             </a:r>
             <a:r>
               <a:rPr lang="en-GB" altLang="en-US" sz="1800" dirty="0" err="1" smtClean="0">
@@ -29839,12 +29703,6 @@
               </a:rPr>
               <a:t>’.</a:t>
             </a:r>
-            <a:endParaRPr lang="en-GB" altLang="en-US" sz="2400" dirty="0" smtClean="0">
-              <a:solidFill>
-                <a:schemeClr val="bg1"/>
-              </a:solidFill>
-              <a:latin typeface="Arial" charset="0"/>
-            </a:endParaRPr>
           </a:p>
           <a:p>
             <a:pPr marL="1252538" indent="-269875">
@@ -29865,13 +29723,13 @@
               <a:t>Size of bins is </a:t>
             </a:r>
             <a:r>
-              <a:rPr lang="en-GB" altLang="en-US" sz="2000" dirty="0" err="1" smtClean="0">
+              <a:rPr lang="en-GB" altLang="en-US" sz="2000" dirty="0" smtClean="0">
                 <a:solidFill>
                   <a:srgbClr val="FFFF99"/>
                 </a:solidFill>
                 <a:latin typeface="Arial" charset="0"/>
               </a:rPr>
-              <a:t>artibtrary</a:t>
+              <a:t>arbitrary </a:t>
             </a:r>
             <a:r>
               <a:rPr lang="en-GB" altLang="en-US" sz="2000" dirty="0" smtClean="0">
@@ -29880,23 +29738,8 @@
                 </a:solidFill>
                 <a:latin typeface="Arial" charset="0"/>
               </a:rPr>
-              <a:t> – whatever works </a:t>
+              <a:t>– whatever works best.</a:t>
             </a:r>
-            <a:r>
-              <a:rPr lang="en-GB" altLang="en-US" sz="2000" dirty="0" smtClean="0">
-                <a:solidFill>
-                  <a:srgbClr val="FFFF99"/>
-                </a:solidFill>
-                <a:latin typeface="Arial" charset="0"/>
-              </a:rPr>
-              <a:t>best.</a:t>
-            </a:r>
-            <a:endParaRPr lang="en-GB" altLang="en-US" sz="2000" dirty="0" smtClean="0">
-              <a:solidFill>
-                <a:srgbClr val="FFFF99"/>
-              </a:solidFill>
-              <a:latin typeface="Arial" charset="0"/>
-            </a:endParaRPr>
           </a:p>
           <a:p>
             <a:pPr marL="1252538" indent="-269875">
@@ -29914,16 +29757,7 @@
                 </a:solidFill>
                 <a:latin typeface="Arial" charset="0"/>
               </a:rPr>
-              <a:t>Normal to have equal-sized bins (here 10</a:t>
-            </a:r>
-            <a:r>
-              <a:rPr lang="en-GB" altLang="en-US" sz="2000" dirty="0" smtClean="0">
-                <a:solidFill>
-                  <a:srgbClr val="FFFF99"/>
-                </a:solidFill>
-                <a:latin typeface="Arial" charset="0"/>
-              </a:rPr>
-              <a:t>).</a:t>
+              <a:t>Normal to have equal-sized bins (here 10).</a:t>
             </a:r>
             <a:endParaRPr lang="en-GB" altLang="en-US" sz="2000" dirty="0">
               <a:solidFill>

</xml_diff>